<commit_message>
Update Sparkling Water slides
</commit_message>
<xml_diff>
--- a/training/sparklingwater_training/SparklingWater_Hands_On_Session.pptx
+++ b/training/sparklingwater_training/SparklingWater_Hands_On_Session.pptx
@@ -1938,7 +1938,7 @@
           </a:ln>
           <a:extLst>
             <a:ext uri="{C572A759-6A51-4108-AA02-DFA0A04FC94B}">
-              <ma14:wrappingTextBoxFlag xmlns:ma14="http://schemas.microsoft.com/office/mac/drawingml/2011/main" val="1"/>
+              <ma14:wrappingTextBoxFlag xmlns:ma14="http://schemas.microsoft.com/office/mac/drawingml/2011/main" xmlns="" val="1"/>
             </a:ext>
           </a:extLst>
         </p:spPr>
@@ -3012,7 +3012,7 @@
           </a:ln>
           <a:extLst>
             <a:ext uri="{C572A759-6A51-4108-AA02-DFA0A04FC94B}">
-              <ma14:wrappingTextBoxFlag xmlns:ma14="http://schemas.microsoft.com/office/mac/drawingml/2011/main" val="1"/>
+              <ma14:wrappingTextBoxFlag xmlns:ma14="http://schemas.microsoft.com/office/mac/drawingml/2011/main" xmlns="" val="1"/>
             </a:ext>
           </a:extLst>
         </p:spPr>
@@ -3283,7 +3283,7 @@
           </a:ln>
           <a:extLst>
             <a:ext uri="{C572A759-6A51-4108-AA02-DFA0A04FC94B}">
-              <ma14:wrappingTextBoxFlag xmlns:ma14="http://schemas.microsoft.com/office/mac/drawingml/2011/main" val="1"/>
+              <ma14:wrappingTextBoxFlag xmlns:ma14="http://schemas.microsoft.com/office/mac/drawingml/2011/main" xmlns="" val="1"/>
             </a:ext>
           </a:extLst>
         </p:spPr>
@@ -4158,7 +4158,7 @@
           </a:ln>
           <a:extLst>
             <a:ext uri="{C572A759-6A51-4108-AA02-DFA0A04FC94B}">
-              <ma14:wrappingTextBoxFlag xmlns:ma14="http://schemas.microsoft.com/office/mac/drawingml/2011/main" val="1"/>
+              <ma14:wrappingTextBoxFlag xmlns:ma14="http://schemas.microsoft.com/office/mac/drawingml/2011/main" xmlns="" val="1"/>
             </a:ext>
           </a:extLst>
         </p:spPr>
@@ -4197,7 +4197,7 @@
           </a:ln>
           <a:extLst>
             <a:ext uri="{C572A759-6A51-4108-AA02-DFA0A04FC94B}">
-              <ma14:wrappingTextBoxFlag xmlns:ma14="http://schemas.microsoft.com/office/mac/drawingml/2011/main" val="1"/>
+              <ma14:wrappingTextBoxFlag xmlns:ma14="http://schemas.microsoft.com/office/mac/drawingml/2011/main" xmlns="" val="1"/>
             </a:ext>
           </a:extLst>
         </p:spPr>
@@ -5178,7 +5178,7 @@
               <a:tabLst/>
             </a:pPr>
             <a:r>
-              <a:rPr lang="en-US" sz="8000" dirty="0" smtClean="0"/>
+              <a:rPr lang="en-US" sz="8000" dirty="0"/>
               <a:t>Hands on Introduction to Sparkling Water</a:t>
             </a:r>
             <a:endParaRPr kumimoji="0" lang="en-US" sz="8000" i="0" u="none" strike="noStrike" cap="none" spc="0" normalizeH="0" baseline="0" dirty="0">
@@ -5201,13 +5201,6 @@
     <a:masterClrMapping/>
   </p:clrMapOvr>
   <p:transition spd="med"/>
-  <p:timing>
-    <p:tnLst>
-      <p:par>
-        <p:cTn id="1" dur="indefinite" restart="never" nodeType="tmRoot"/>
-      </p:par>
-    </p:tnLst>
-  </p:timing>
 </p:sld>
 </file>
 
@@ -5260,7 +5253,7 @@
           </a:lstStyle>
           <a:p>
             <a:r>
-              <a:rPr lang="en-US" dirty="0" smtClean="0"/>
+              <a:rPr lang="en-US" dirty="0"/>
               <a:t>How Does it Work?</a:t>
             </a:r>
             <a:endParaRPr dirty="0"/>
@@ -5302,13 +5295,6 @@
     <a:masterClrMapping/>
   </p:clrMapOvr>
   <p:transition spd="med"/>
-  <p:timing>
-    <p:tnLst>
-      <p:par>
-        <p:cTn id="1" dur="indefinite" restart="never" fill="hold" nodeType="tmRoot"/>
-      </p:par>
-    </p:tnLst>
-  </p:timing>
 </p:sld>
 </file>
 
@@ -5361,7 +5347,7 @@
           </a:lstStyle>
           <a:p>
             <a:r>
-              <a:rPr lang="en-US" dirty="0" smtClean="0"/>
+              <a:rPr lang="en-US" dirty="0"/>
               <a:t>How Does it Work?</a:t>
             </a:r>
             <a:endParaRPr dirty="0"/>
@@ -5403,13 +5389,6 @@
     <a:masterClrMapping/>
   </p:clrMapOvr>
   <p:transition spd="med"/>
-  <p:timing>
-    <p:tnLst>
-      <p:par>
-        <p:cTn id="1" dur="indefinite" restart="never" fill="hold" nodeType="tmRoot"/>
-      </p:par>
-    </p:tnLst>
-  </p:timing>
 </p:sld>
 </file>
 
@@ -5464,7 +5443,7 @@
           </a:lstStyle>
           <a:p>
             <a:r>
-              <a:rPr lang="en-US" dirty="0" smtClean="0">
+              <a:rPr lang="en-US" dirty="0">
                 <a:latin typeface="Calibri" charset="0"/>
                 <a:ea typeface="Calibri" charset="0"/>
                 <a:cs typeface="Calibri" charset="0"/>
@@ -5490,13 +5469,6 @@
     <a:masterClrMapping/>
   </p:clrMapOvr>
   <p:transition spd="slow"/>
-  <p:timing>
-    <p:tnLst>
-      <p:par>
-        <p:cTn id="1" dur="indefinite" restart="never" nodeType="tmRoot"/>
-      </p:par>
-    </p:tnLst>
-  </p:timing>
 </p:sld>
 </file>
 
@@ -5533,18 +5505,13 @@
           <a:lstStyle/>
           <a:p>
             <a:r>
-              <a:rPr lang="en-US" dirty="0" smtClean="0">
+              <a:rPr lang="en-US" dirty="0">
                 <a:latin typeface="Calibri" charset="0"/>
                 <a:ea typeface="Calibri" charset="0"/>
                 <a:cs typeface="Calibri" charset="0"/>
               </a:rPr>
               <a:t>Use Case</a:t>
             </a:r>
-            <a:endParaRPr lang="en-US" dirty="0">
-              <a:latin typeface="Calibri" charset="0"/>
-              <a:ea typeface="Calibri" charset="0"/>
-              <a:cs typeface="Calibri" charset="0"/>
-            </a:endParaRPr>
           </a:p>
         </p:txBody>
       </p:sp>
@@ -5567,7 +5534,7 @@
               <a:buNone/>
             </a:pPr>
             <a:r>
-              <a:rPr lang="en-US" b="1" dirty="0" smtClean="0">
+              <a:rPr lang="en-US" b="1" dirty="0">
                 <a:latin typeface="Calibri" charset="0"/>
                 <a:ea typeface="Calibri" charset="0"/>
                 <a:cs typeface="Calibri" charset="0"/>
@@ -5580,13 +5547,15 @@
               <a:buNone/>
             </a:pPr>
             <a:r>
-              <a:rPr lang="en-US" dirty="0" smtClean="0">
+              <a:rPr lang="en-US" dirty="0">
                 <a:latin typeface="Calibri" charset="0"/>
                 <a:ea typeface="Calibri" charset="0"/>
                 <a:cs typeface="Calibri" charset="0"/>
               </a:rPr>
               <a:t>Predict whether an arrest will be made for a given crime. </a:t>
             </a:r>
+          </a:p>
+          <a:p>
             <a:endParaRPr lang="en-US" dirty="0">
               <a:latin typeface="Calibri" charset="0"/>
               <a:ea typeface="Calibri" charset="0"/>
@@ -5594,18 +5563,11 @@
             </a:endParaRPr>
           </a:p>
           <a:p>
-            <a:endParaRPr lang="en-US" dirty="0" smtClean="0">
-              <a:latin typeface="Calibri" charset="0"/>
-              <a:ea typeface="Calibri" charset="0"/>
-              <a:cs typeface="Calibri" charset="0"/>
-            </a:endParaRPr>
-          </a:p>
-          <a:p>
             <a:pPr marL="0" indent="0">
               <a:buNone/>
             </a:pPr>
             <a:r>
-              <a:rPr lang="en-US" b="1" dirty="0" smtClean="0">
+              <a:rPr lang="en-US" b="1" dirty="0">
                 <a:latin typeface="Calibri" charset="0"/>
                 <a:ea typeface="Calibri" charset="0"/>
                 <a:cs typeface="Calibri" charset="0"/>
@@ -5618,7 +5580,7 @@
               <a:buNone/>
             </a:pPr>
             <a:r>
-              <a:rPr lang="en-US" dirty="0" smtClean="0">
+              <a:rPr lang="en-US" dirty="0">
                 <a:latin typeface="Calibri" charset="0"/>
                 <a:ea typeface="Calibri" charset="0"/>
                 <a:cs typeface="Calibri" charset="0"/>
@@ -5641,7 +5603,7 @@
               <a:buNone/>
             </a:pPr>
             <a:r>
-              <a:rPr lang="en-US" b="1" dirty="0" smtClean="0">
+              <a:rPr lang="en-US" b="1" dirty="0">
                 <a:latin typeface="Calibri" charset="0"/>
                 <a:ea typeface="Calibri" charset="0"/>
                 <a:cs typeface="Calibri" charset="0"/>
@@ -5654,18 +5616,13 @@
               <a:buNone/>
             </a:pPr>
             <a:r>
-              <a:rPr lang="en-US" dirty="0" smtClean="0">
+              <a:rPr lang="en-US" dirty="0">
                 <a:latin typeface="Calibri" charset="0"/>
                 <a:ea typeface="Calibri" charset="0"/>
                 <a:cs typeface="Calibri" charset="0"/>
               </a:rPr>
               <a:t>Join crime data with external data like weather and socioeconomic factors to train a model that will predict arrest.</a:t>
             </a:r>
-            <a:endParaRPr lang="en-US" dirty="0">
-              <a:latin typeface="Calibri" charset="0"/>
-              <a:ea typeface="Calibri" charset="0"/>
-              <a:cs typeface="Calibri" charset="0"/>
-            </a:endParaRPr>
           </a:p>
         </p:txBody>
       </p:sp>
@@ -5798,18 +5755,13 @@
           <a:lstStyle/>
           <a:p>
             <a:r>
-              <a:rPr lang="en-US" dirty="0" smtClean="0">
+              <a:rPr lang="en-US" dirty="0">
                 <a:latin typeface="Calibri" charset="0"/>
                 <a:ea typeface="Calibri" charset="0"/>
                 <a:cs typeface="Calibri" charset="0"/>
               </a:rPr>
               <a:t>Use Case</a:t>
             </a:r>
-            <a:endParaRPr lang="en-US" dirty="0">
-              <a:latin typeface="Calibri" charset="0"/>
-              <a:ea typeface="Calibri" charset="0"/>
-              <a:cs typeface="Calibri" charset="0"/>
-            </a:endParaRPr>
           </a:p>
         </p:txBody>
       </p:sp>
@@ -6003,7 +5955,7 @@
               <a:tabLst/>
             </a:pPr>
             <a:r>
-              <a:rPr kumimoji="0" lang="en-US" sz="3500" b="0" i="0" u="none" strike="noStrike" cap="none" spc="0" normalizeH="0" baseline="0" dirty="0" smtClean="0">
+              <a:rPr kumimoji="0" lang="en-US" sz="3500" b="0" i="0" u="none" strike="noStrike" cap="none" spc="0" normalizeH="0" baseline="0" dirty="0">
                 <a:ln>
                   <a:noFill/>
                 </a:ln>
@@ -6019,20 +5971,6 @@
               </a:rPr>
               <a:t>Weather</a:t>
             </a:r>
-            <a:endParaRPr kumimoji="0" lang="en-US" sz="3500" b="0" i="0" u="none" strike="noStrike" cap="none" spc="0" normalizeH="0" baseline="0" dirty="0">
-              <a:ln>
-                <a:noFill/>
-              </a:ln>
-              <a:solidFill>
-                <a:srgbClr val="000000"/>
-              </a:solidFill>
-              <a:effectLst/>
-              <a:uFillTx/>
-              <a:latin typeface="+mn-lt"/>
-              <a:ea typeface="+mn-ea"/>
-              <a:cs typeface="+mn-cs"/>
-              <a:sym typeface="Calibri"/>
-            </a:endParaRPr>
           </a:p>
         </p:txBody>
       </p:sp>
@@ -6093,7 +6031,7 @@
               <a:tabLst/>
             </a:pPr>
             <a:r>
-              <a:rPr kumimoji="0" lang="en-US" sz="3500" b="0" i="0" u="none" strike="noStrike" cap="none" spc="0" normalizeH="0" baseline="0" dirty="0" smtClean="0">
+              <a:rPr kumimoji="0" lang="en-US" sz="3500" b="0" i="0" u="none" strike="noStrike" cap="none" spc="0" normalizeH="0" baseline="0" dirty="0">
                 <a:ln>
                   <a:noFill/>
                 </a:ln>
@@ -6109,20 +6047,6 @@
               </a:rPr>
               <a:t>Census</a:t>
             </a:r>
-            <a:endParaRPr kumimoji="0" lang="en-US" sz="3500" b="0" i="0" u="none" strike="noStrike" cap="none" spc="0" normalizeH="0" baseline="0" dirty="0">
-              <a:ln>
-                <a:noFill/>
-              </a:ln>
-              <a:solidFill>
-                <a:srgbClr val="000000"/>
-              </a:solidFill>
-              <a:effectLst/>
-              <a:uFillTx/>
-              <a:latin typeface="+mn-lt"/>
-              <a:ea typeface="+mn-ea"/>
-              <a:cs typeface="+mn-cs"/>
-              <a:sym typeface="Calibri"/>
-            </a:endParaRPr>
           </a:p>
         </p:txBody>
       </p:sp>
@@ -6183,7 +6107,7 @@
               <a:tabLst/>
             </a:pPr>
             <a:r>
-              <a:rPr kumimoji="0" lang="en-US" sz="3500" b="0" i="0" u="none" strike="noStrike" cap="none" spc="0" normalizeH="0" baseline="0" dirty="0" smtClean="0">
+              <a:rPr kumimoji="0" lang="en-US" sz="3500" b="0" i="0" u="none" strike="noStrike" cap="none" spc="0" normalizeH="0" baseline="0" dirty="0">
                 <a:ln>
                   <a:noFill/>
                 </a:ln>
@@ -6199,20 +6123,6 @@
               </a:rPr>
               <a:t>Crimes</a:t>
             </a:r>
-            <a:endParaRPr kumimoji="0" lang="en-US" sz="3500" b="0" i="0" u="none" strike="noStrike" cap="none" spc="0" normalizeH="0" baseline="0" dirty="0">
-              <a:ln>
-                <a:noFill/>
-              </a:ln>
-              <a:solidFill>
-                <a:srgbClr val="000000"/>
-              </a:solidFill>
-              <a:effectLst/>
-              <a:uFillTx/>
-              <a:latin typeface="+mn-lt"/>
-              <a:ea typeface="+mn-ea"/>
-              <a:cs typeface="+mn-cs"/>
-              <a:sym typeface="Calibri"/>
-            </a:endParaRPr>
           </a:p>
         </p:txBody>
       </p:sp>
@@ -11016,7 +10926,7 @@
               <a:tabLst/>
             </a:pPr>
             <a:r>
-              <a:rPr kumimoji="0" lang="en-US" sz="3500" b="0" i="0" u="none" strike="noStrike" cap="none" spc="0" normalizeH="0" baseline="0" dirty="0" smtClean="0">
+              <a:rPr kumimoji="0" lang="en-US" sz="3500" b="0" i="0" u="none" strike="noStrike" cap="none" spc="0" normalizeH="0" baseline="0" dirty="0">
                 <a:ln>
                   <a:noFill/>
                 </a:ln>
@@ -11032,20 +10942,6 @@
               </a:rPr>
               <a:t>Data Munging</a:t>
             </a:r>
-            <a:endParaRPr kumimoji="0" lang="en-US" sz="3500" b="0" i="0" u="none" strike="noStrike" cap="none" spc="0" normalizeH="0" baseline="0" dirty="0">
-              <a:ln>
-                <a:noFill/>
-              </a:ln>
-              <a:solidFill>
-                <a:srgbClr val="000000"/>
-              </a:solidFill>
-              <a:effectLst/>
-              <a:uFillTx/>
-              <a:latin typeface="+mn-lt"/>
-              <a:ea typeface="+mn-ea"/>
-              <a:cs typeface="+mn-cs"/>
-              <a:sym typeface="Calibri"/>
-            </a:endParaRPr>
           </a:p>
         </p:txBody>
       </p:sp>
@@ -18641,7 +18537,7 @@
               <a:tabLst/>
             </a:pPr>
             <a:r>
-              <a:rPr lang="en-US" sz="3500" dirty="0" smtClean="0"/>
+              <a:rPr lang="en-US" sz="3500" dirty="0"/>
               <a:t>Train</a:t>
             </a:r>
           </a:p>
@@ -18663,7 +18559,7 @@
               <a:tabLst/>
             </a:pPr>
             <a:r>
-              <a:rPr kumimoji="0" lang="en-US" sz="3500" b="0" i="0" u="none" strike="noStrike" cap="none" spc="0" normalizeH="0" baseline="0" dirty="0" smtClean="0">
+              <a:rPr kumimoji="0" lang="en-US" sz="3500" b="0" i="0" u="none" strike="noStrike" cap="none" spc="0" normalizeH="0" baseline="0" dirty="0">
                 <a:ln>
                   <a:noFill/>
                 </a:ln>
@@ -18677,7 +18573,7 @@
               <a:t>Deep</a:t>
             </a:r>
             <a:r>
-              <a:rPr kumimoji="0" lang="en-US" sz="3500" b="0" i="0" u="none" strike="noStrike" cap="none" spc="0" normalizeH="0" dirty="0" smtClean="0">
+              <a:rPr kumimoji="0" lang="en-US" sz="3500" b="0" i="0" u="none" strike="noStrike" cap="none" spc="0" normalizeH="0" dirty="0">
                 <a:ln>
                   <a:noFill/>
                 </a:ln>
@@ -18763,7 +18659,7 @@
               <a:tabLst/>
             </a:pPr>
             <a:r>
-              <a:rPr lang="en-US" sz="3500" dirty="0" smtClean="0"/>
+              <a:rPr lang="en-US" sz="3500" dirty="0"/>
               <a:t>Train</a:t>
             </a:r>
           </a:p>
@@ -18785,7 +18681,7 @@
               <a:tabLst/>
             </a:pPr>
             <a:r>
-              <a:rPr kumimoji="0" lang="en-US" sz="3500" b="0" i="0" u="none" strike="noStrike" cap="none" spc="0" normalizeH="0" baseline="0" dirty="0" smtClean="0">
+              <a:rPr kumimoji="0" lang="en-US" sz="3500" b="0" i="0" u="none" strike="noStrike" cap="none" spc="0" normalizeH="0" baseline="0" dirty="0">
                 <a:ln>
                   <a:noFill/>
                 </a:ln>
@@ -18798,17 +18694,6 @@
               </a:rPr>
               <a:t>GBM</a:t>
             </a:r>
-            <a:endParaRPr kumimoji="0" lang="en-US" sz="3500" b="0" i="0" u="none" strike="noStrike" cap="none" spc="0" normalizeH="0" baseline="0" dirty="0">
-              <a:ln>
-                <a:noFill/>
-              </a:ln>
-              <a:solidFill>
-                <a:srgbClr val="000000"/>
-              </a:solidFill>
-              <a:effectLst/>
-              <a:uFillTx/>
-              <a:sym typeface="Calibri"/>
-            </a:endParaRPr>
           </a:p>
         </p:txBody>
       </p:sp>
@@ -18869,7 +18754,7 @@
               <a:tabLst/>
             </a:pPr>
             <a:r>
-              <a:rPr kumimoji="0" lang="en-US" sz="3500" b="0" i="0" u="none" strike="noStrike" cap="none" spc="0" normalizeH="0" baseline="0" dirty="0" smtClean="0">
+              <a:rPr kumimoji="0" lang="en-US" sz="3500" b="0" i="0" u="none" strike="noStrike" cap="none" spc="0" normalizeH="0" baseline="0" dirty="0">
                 <a:ln>
                   <a:noFill/>
                 </a:ln>
@@ -18885,20 +18770,6 @@
               </a:rPr>
               <a:t>Evaluate Models</a:t>
             </a:r>
-            <a:endParaRPr kumimoji="0" lang="en-US" sz="3500" b="0" i="0" u="none" strike="noStrike" cap="none" spc="0" normalizeH="0" baseline="0" dirty="0">
-              <a:ln>
-                <a:noFill/>
-              </a:ln>
-              <a:solidFill>
-                <a:srgbClr val="000000"/>
-              </a:solidFill>
-              <a:effectLst/>
-              <a:uFillTx/>
-              <a:latin typeface="+mn-lt"/>
-              <a:ea typeface="+mn-ea"/>
-              <a:cs typeface="+mn-cs"/>
-              <a:sym typeface="Calibri"/>
-            </a:endParaRPr>
           </a:p>
         </p:txBody>
       </p:sp>
@@ -18959,7 +18830,7 @@
               <a:tabLst/>
             </a:pPr>
             <a:r>
-              <a:rPr kumimoji="0" lang="en-US" sz="3500" b="0" i="0" u="none" strike="noStrike" cap="none" spc="0" normalizeH="0" baseline="0" dirty="0" smtClean="0">
+              <a:rPr kumimoji="0" lang="en-US" sz="3500" b="0" i="0" u="none" strike="noStrike" cap="none" spc="0" normalizeH="0" baseline="0" dirty="0">
                 <a:ln>
                   <a:noFill/>
                 </a:ln>
@@ -18976,7 +18847,7 @@
               <a:t>Score New</a:t>
             </a:r>
             <a:r>
-              <a:rPr kumimoji="0" lang="en-US" sz="3500" b="0" i="0" u="none" strike="noStrike" cap="none" spc="0" normalizeH="0" dirty="0" smtClean="0">
+              <a:rPr kumimoji="0" lang="en-US" sz="3500" b="0" i="0" u="none" strike="noStrike" cap="none" spc="0" normalizeH="0" dirty="0">
                 <a:ln>
                   <a:noFill/>
                 </a:ln>
@@ -19262,7 +19133,7 @@
               <a:tabLst/>
             </a:pPr>
             <a:r>
-              <a:rPr kumimoji="0" lang="en-US" sz="3500" b="0" i="0" u="none" strike="noStrike" cap="none" spc="0" normalizeH="0" baseline="0" dirty="0" smtClean="0">
+              <a:rPr kumimoji="0" lang="en-US" sz="3500" b="0" i="0" u="none" strike="noStrike" cap="none" spc="0" normalizeH="0" baseline="0" dirty="0">
                 <a:ln>
                   <a:noFill/>
                 </a:ln>
@@ -19278,20 +19149,6 @@
               </a:rPr>
               <a:t>Spark SQL Join</a:t>
             </a:r>
-            <a:endParaRPr kumimoji="0" lang="en-US" sz="3500" b="0" i="0" u="none" strike="noStrike" cap="none" spc="0" normalizeH="0" baseline="0" dirty="0">
-              <a:ln>
-                <a:noFill/>
-              </a:ln>
-              <a:solidFill>
-                <a:srgbClr val="000000"/>
-              </a:solidFill>
-              <a:effectLst/>
-              <a:uFillTx/>
-              <a:latin typeface="+mn-lt"/>
-              <a:ea typeface="+mn-ea"/>
-              <a:cs typeface="+mn-cs"/>
-              <a:sym typeface="Calibri"/>
-            </a:endParaRPr>
           </a:p>
         </p:txBody>
       </p:sp>
@@ -19352,7 +19209,7 @@
               <a:tabLst/>
             </a:pPr>
             <a:r>
-              <a:rPr kumimoji="0" lang="en-US" sz="3500" b="0" i="0" u="none" strike="noStrike" cap="none" spc="0" normalizeH="0" baseline="0" dirty="0" smtClean="0">
+              <a:rPr kumimoji="0" lang="en-US" sz="3500" b="0" i="0" u="none" strike="noStrike" cap="none" spc="0" normalizeH="0" baseline="0" dirty="0">
                 <a:ln>
                   <a:noFill/>
                 </a:ln>
@@ -19368,20 +19225,6 @@
               </a:rPr>
               <a:t>Split Table</a:t>
             </a:r>
-            <a:endParaRPr kumimoji="0" lang="en-US" sz="3500" b="0" i="0" u="none" strike="noStrike" cap="none" spc="0" normalizeH="0" baseline="0" dirty="0">
-              <a:ln>
-                <a:noFill/>
-              </a:ln>
-              <a:solidFill>
-                <a:srgbClr val="000000"/>
-              </a:solidFill>
-              <a:effectLst/>
-              <a:uFillTx/>
-              <a:latin typeface="+mn-lt"/>
-              <a:ea typeface="+mn-ea"/>
-              <a:cs typeface="+mn-cs"/>
-              <a:sym typeface="Calibri"/>
-            </a:endParaRPr>
           </a:p>
         </p:txBody>
       </p:sp>
@@ -19522,18 +19365,13 @@
           <a:lstStyle/>
           <a:p>
             <a:r>
-              <a:rPr lang="en-US" dirty="0" smtClean="0">
+              <a:rPr lang="en-US" dirty="0">
                 <a:latin typeface="Calibri" charset="0"/>
                 <a:ea typeface="Calibri" charset="0"/>
                 <a:cs typeface="Calibri" charset="0"/>
               </a:rPr>
               <a:t>Resources</a:t>
             </a:r>
-            <a:endParaRPr lang="en-US" dirty="0">
-              <a:latin typeface="Calibri" charset="0"/>
-              <a:ea typeface="Calibri" charset="0"/>
-              <a:cs typeface="Calibri" charset="0"/>
-            </a:endParaRPr>
           </a:p>
         </p:txBody>
       </p:sp>
@@ -19553,7 +19391,7 @@
           <a:lstStyle/>
           <a:p>
             <a:r>
-              <a:rPr lang="en-US" dirty="0" smtClean="0">
+              <a:rPr lang="en-US" dirty="0">
                 <a:latin typeface="Calibri" charset="0"/>
                 <a:ea typeface="Calibri" charset="0"/>
                 <a:cs typeface="Calibri" charset="0"/>
@@ -19561,59 +19399,12 @@
               <a:t>Data</a:t>
             </a:r>
             <a:r>
-              <a:rPr lang="en-US" dirty="0" smtClean="0">
+              <a:rPr lang="en-US">
                 <a:latin typeface="Calibri" charset="0"/>
                 <a:ea typeface="Calibri" charset="0"/>
                 <a:cs typeface="Calibri" charset="0"/>
               </a:rPr>
-              <a:t>: sparkling-water-2.1.2/examples/smalldata</a:t>
-            </a:r>
-            <a:endParaRPr lang="en-US" dirty="0" smtClean="0">
-              <a:latin typeface="Calibri" charset="0"/>
-              <a:ea typeface="Calibri" charset="0"/>
-              <a:cs typeface="Calibri" charset="0"/>
-            </a:endParaRPr>
-          </a:p>
-          <a:p>
-            <a:endParaRPr lang="en-US" dirty="0" smtClean="0">
-              <a:latin typeface="Calibri" charset="0"/>
-              <a:ea typeface="Calibri" charset="0"/>
-              <a:cs typeface="Calibri" charset="0"/>
-            </a:endParaRPr>
-          </a:p>
-          <a:p>
-            <a:r>
-              <a:rPr lang="en-US" dirty="0" smtClean="0">
-                <a:latin typeface="Calibri" charset="0"/>
-                <a:ea typeface="Calibri" charset="0"/>
-                <a:cs typeface="Calibri" charset="0"/>
-              </a:rPr>
-              <a:t>Scala Script</a:t>
-            </a:r>
-            <a:r>
-              <a:rPr lang="en-US" dirty="0" smtClean="0">
-                <a:latin typeface="Calibri" charset="0"/>
-                <a:ea typeface="Calibri" charset="0"/>
-                <a:cs typeface="Calibri" charset="0"/>
-              </a:rPr>
-              <a:t>: ChicagoCrimeDemo.scala</a:t>
-            </a:r>
-          </a:p>
-          <a:p>
-            <a:endParaRPr lang="en-US" dirty="0" smtClean="0">
-              <a:latin typeface="Calibri" charset="0"/>
-              <a:ea typeface="Calibri" charset="0"/>
-              <a:cs typeface="Calibri" charset="0"/>
-            </a:endParaRPr>
-          </a:p>
-          <a:p>
-            <a:r>
-              <a:rPr lang="en-US" dirty="0" smtClean="0">
-                <a:latin typeface="Calibri" charset="0"/>
-                <a:ea typeface="Calibri" charset="0"/>
-                <a:cs typeface="Calibri" charset="0"/>
-              </a:rPr>
-              <a:t>Python Script</a:t>
+              <a:t>: sparkling-water-2.3.5/</a:t>
             </a:r>
             <a:r>
               <a:rPr lang="en-US" dirty="0">
@@ -19621,21 +19412,42 @@
                 <a:ea typeface="Calibri" charset="0"/>
                 <a:cs typeface="Calibri" charset="0"/>
               </a:rPr>
-              <a:t>: </a:t>
+              <a:t>examples/smalldata</a:t>
             </a:r>
+          </a:p>
+          <a:p>
+            <a:endParaRPr lang="en-US" dirty="0">
+              <a:latin typeface="Calibri" charset="0"/>
+              <a:ea typeface="Calibri" charset="0"/>
+              <a:cs typeface="Calibri" charset="0"/>
+            </a:endParaRPr>
+          </a:p>
+          <a:p>
             <a:r>
-              <a:rPr lang="en-US" dirty="0" smtClean="0">
+              <a:rPr lang="en-US" dirty="0">
                 <a:latin typeface="Calibri" charset="0"/>
                 <a:ea typeface="Calibri" charset="0"/>
                 <a:cs typeface="Calibri" charset="0"/>
               </a:rPr>
-              <a:t>ChicagoCrimeDemo.ipynb</a:t>
+              <a:t>Scala Script: ChicagoCrimeDemo.scala</a:t>
             </a:r>
-            <a:endParaRPr lang="en-US" dirty="0" smtClean="0">
+          </a:p>
+          <a:p>
+            <a:endParaRPr lang="en-US" dirty="0">
               <a:latin typeface="Calibri" charset="0"/>
               <a:ea typeface="Calibri" charset="0"/>
               <a:cs typeface="Calibri" charset="0"/>
             </a:endParaRPr>
+          </a:p>
+          <a:p>
+            <a:r>
+              <a:rPr lang="en-US" dirty="0">
+                <a:latin typeface="Calibri" charset="0"/>
+                <a:ea typeface="Calibri" charset="0"/>
+                <a:cs typeface="Calibri" charset="0"/>
+              </a:rPr>
+              <a:t>Python Script: ChicagoCrimeDemo.ipynb</a:t>
+            </a:r>
           </a:p>
         </p:txBody>
       </p:sp>
@@ -19704,7 +19516,7 @@
           </a:lstStyle>
           <a:p>
             <a:r>
-              <a:rPr lang="en-US" dirty="0" smtClean="0">
+              <a:rPr lang="en-US" dirty="0">
                 <a:latin typeface="Calibri" charset="0"/>
                 <a:ea typeface="Calibri" charset="0"/>
                 <a:cs typeface="Calibri" charset="0"/>
@@ -19730,13 +19542,6 @@
     <a:masterClrMapping/>
   </p:clrMapOvr>
   <p:transition spd="slow"/>
-  <p:timing>
-    <p:tnLst>
-      <p:par>
-        <p:cTn id="1" dur="indefinite" restart="never" nodeType="tmRoot"/>
-      </p:par>
-    </p:tnLst>
-  </p:timing>
 </p:sld>
 </file>
 
@@ -19789,7 +19594,7 @@
           </a:lstStyle>
           <a:p>
             <a:r>
-              <a:rPr lang="en-US" dirty="0" smtClean="0">
+              <a:rPr lang="en-US" dirty="0">
                 <a:latin typeface="Calibri" charset="0"/>
                 <a:ea typeface="Calibri" charset="0"/>
                 <a:cs typeface="Calibri" charset="0"/>
@@ -19815,13 +19620,6 @@
     <a:masterClrMapping/>
   </p:clrMapOvr>
   <p:transition spd="slow"/>
-  <p:timing>
-    <p:tnLst>
-      <p:par>
-        <p:cTn id="1" dur="indefinite" restart="never" nodeType="tmRoot"/>
-      </p:par>
-    </p:tnLst>
-  </p:timing>
 </p:sld>
 </file>
 
@@ -19858,18 +19656,13 @@
           <a:lstStyle/>
           <a:p>
             <a:r>
-              <a:rPr lang="en-US" dirty="0" smtClean="0">
+              <a:rPr lang="en-US" dirty="0">
                 <a:latin typeface="Calibri" charset="0"/>
                 <a:ea typeface="Calibri" charset="0"/>
                 <a:cs typeface="Calibri" charset="0"/>
               </a:rPr>
               <a:t>Today’s Talk</a:t>
             </a:r>
-            <a:endParaRPr lang="en-US" dirty="0">
-              <a:latin typeface="Calibri" charset="0"/>
-              <a:ea typeface="Calibri" charset="0"/>
-              <a:cs typeface="Calibri" charset="0"/>
-            </a:endParaRPr>
           </a:p>
         </p:txBody>
       </p:sp>
@@ -19894,7 +19687,7 @@
           <a:lstStyle/>
           <a:p>
             <a:r>
-              <a:rPr lang="en-US" dirty="0" smtClean="0">
+              <a:rPr lang="en-US" dirty="0">
                 <a:solidFill>
                   <a:schemeClr val="tx1"/>
                 </a:solidFill>
@@ -19907,7 +19700,7 @@
           </a:p>
           <a:p>
             <a:r>
-              <a:rPr lang="en-US" dirty="0" smtClean="0">
+              <a:rPr lang="en-US" dirty="0">
                 <a:solidFill>
                   <a:schemeClr val="tx1"/>
                 </a:solidFill>
@@ -19977,7 +19770,7 @@
               <a:tabLst/>
             </a:pPr>
             <a:r>
-              <a:rPr lang="en-US" sz="5000" b="1" dirty="0" smtClean="0">
+              <a:rPr lang="en-US" sz="5000" b="1" dirty="0">
                 <a:latin typeface="Calibri" charset="0"/>
                 <a:ea typeface="Calibri" charset="0"/>
                 <a:cs typeface="Calibri" charset="0"/>
@@ -20022,7 +19815,7 @@
           </a:ln>
           <a:extLst>
             <a:ext uri="{C572A759-6A51-4108-AA02-DFA0A04FC94B}">
-              <ma14:wrappingTextBoxFlag xmlns:ma14="http://schemas.microsoft.com/office/mac/drawingml/2011/main" val="1"/>
+              <ma14:wrappingTextBoxFlag xmlns:ma14="http://schemas.microsoft.com/office/mac/drawingml/2011/main" xmlns="" val="1"/>
             </a:ext>
           </a:extLst>
         </p:spPr>
@@ -20296,7 +20089,7 @@
           <a:p>
             <a:pPr hangingPunct="1"/>
             <a:r>
-              <a:rPr lang="en-US" dirty="0" smtClean="0">
+              <a:rPr lang="en-US" dirty="0">
                 <a:solidFill>
                   <a:schemeClr val="tx1"/>
                 </a:solidFill>
@@ -20310,7 +20103,7 @@
           <a:p>
             <a:pPr hangingPunct="1"/>
             <a:r>
-              <a:rPr lang="en-US" dirty="0" smtClean="0">
+              <a:rPr lang="en-US" dirty="0">
                 <a:solidFill>
                   <a:schemeClr val="tx1"/>
                 </a:solidFill>
@@ -20380,7 +20173,7 @@
               <a:tabLst/>
             </a:pPr>
             <a:r>
-              <a:rPr kumimoji="0" lang="en-US" sz="5000" b="1" i="0" u="none" strike="noStrike" cap="none" spc="0" normalizeH="0" baseline="0" dirty="0" smtClean="0">
+              <a:rPr kumimoji="0" lang="en-US" sz="5000" b="1" i="0" u="none" strike="noStrike" cap="none" spc="0" normalizeH="0" baseline="0" dirty="0">
                 <a:ln>
                   <a:noFill/>
                 </a:ln>
@@ -20397,7 +20190,7 @@
               <a:t>Introduction to</a:t>
             </a:r>
             <a:r>
-              <a:rPr kumimoji="0" lang="en-US" sz="5000" b="1" i="0" u="none" strike="noStrike" cap="none" spc="0" normalizeH="0" dirty="0" smtClean="0">
+              <a:rPr kumimoji="0" lang="en-US" sz="5000" b="1" i="0" u="none" strike="noStrike" cap="none" spc="0" normalizeH="0" dirty="0">
                 <a:ln>
                   <a:noFill/>
                 </a:ln>
@@ -20539,7 +20332,7 @@
           </a:ln>
           <a:extLst>
             <a:ext uri="{C572A759-6A51-4108-AA02-DFA0A04FC94B}">
-              <ma14:wrappingTextBoxFlag xmlns:ma14="http://schemas.microsoft.com/office/mac/drawingml/2011/main" val="1"/>
+              <ma14:wrappingTextBoxFlag xmlns:ma14="http://schemas.microsoft.com/office/mac/drawingml/2011/main" xmlns="" val="1"/>
             </a:ext>
           </a:extLst>
         </p:spPr>
@@ -20813,7 +20606,7 @@
           <a:p>
             <a:pPr hangingPunct="1"/>
             <a:r>
-              <a:rPr lang="en-US" dirty="0" smtClean="0">
+              <a:rPr lang="en-US" dirty="0">
                 <a:solidFill>
                   <a:schemeClr val="tx1"/>
                 </a:solidFill>
@@ -20822,20 +20615,6 @@
                 <a:cs typeface="Calibri" charset="0"/>
               </a:rPr>
               <a:t>Our Use Case</a:t>
-            </a:r>
-          </a:p>
-          <a:p>
-            <a:pPr hangingPunct="1"/>
-            <a:r>
-              <a:rPr lang="en-US" dirty="0" smtClean="0">
-                <a:solidFill>
-                  <a:schemeClr val="tx1"/>
-                </a:solidFill>
-                <a:latin typeface="Calibri" charset="0"/>
-                <a:ea typeface="Calibri" charset="0"/>
-                <a:cs typeface="Calibri" charset="0"/>
-              </a:rPr>
-              <a:t>Importing data into H2O</a:t>
             </a:r>
           </a:p>
           <a:p>
@@ -20849,19 +20628,11 @@
                 <a:ea typeface="Calibri" charset="0"/>
                 <a:cs typeface="Calibri" charset="0"/>
               </a:rPr>
-              <a:t>Converting </a:t>
+              <a:t>Importing data into H2O</a:t>
             </a:r>
-            <a:r>
-              <a:rPr lang="en-US" dirty="0" smtClean="0">
-                <a:solidFill>
-                  <a:schemeClr val="tx1"/>
-                </a:solidFill>
-                <a:latin typeface="Calibri" charset="0"/>
-                <a:ea typeface="Calibri" charset="0"/>
-                <a:cs typeface="Calibri" charset="0"/>
-              </a:rPr>
-              <a:t>Spark Dataframe </a:t>
-            </a:r>
+          </a:p>
+          <a:p>
+            <a:pPr hangingPunct="1"/>
             <a:r>
               <a:rPr lang="en-US" dirty="0">
                 <a:solidFill>
@@ -20871,24 +20642,13 @@
                 <a:ea typeface="Calibri" charset="0"/>
                 <a:cs typeface="Calibri" charset="0"/>
               </a:rPr>
-              <a:t>to H2O </a:t>
-            </a:r>
-            <a:r>
-              <a:rPr lang="en-US" dirty="0" smtClean="0">
-                <a:solidFill>
-                  <a:schemeClr val="tx1"/>
-                </a:solidFill>
-                <a:latin typeface="Calibri" charset="0"/>
-                <a:ea typeface="Calibri" charset="0"/>
-                <a:cs typeface="Calibri" charset="0"/>
-              </a:rPr>
-              <a:t>Frame and vice versa</a:t>
+              <a:t>Converting Spark Dataframe to H2O Frame and vice versa</a:t>
             </a:r>
           </a:p>
           <a:p>
             <a:pPr hangingPunct="1"/>
             <a:r>
-              <a:rPr lang="en-US" dirty="0" smtClean="0">
+              <a:rPr lang="en-US" dirty="0">
                 <a:solidFill>
                   <a:schemeClr val="tx1"/>
                 </a:solidFill>
@@ -20902,7 +20662,7 @@
           <a:p>
             <a:pPr hangingPunct="1"/>
             <a:r>
-              <a:rPr lang="en-US" dirty="0" smtClean="0">
+              <a:rPr lang="en-US" dirty="0">
                 <a:solidFill>
                   <a:schemeClr val="tx1"/>
                 </a:solidFill>
@@ -20972,7 +20732,7 @@
               <a:tabLst/>
             </a:pPr>
             <a:r>
-              <a:rPr lang="en-US" sz="5000" b="1" dirty="0" smtClean="0">
+              <a:rPr lang="en-US" sz="5000" b="1" dirty="0">
                 <a:latin typeface="Calibri" charset="0"/>
                 <a:ea typeface="Calibri" charset="0"/>
                 <a:cs typeface="Calibri" charset="0"/>
@@ -21051,13 +20811,6 @@
     <a:masterClrMapping/>
   </p:clrMapOvr>
   <p:transition spd="med"/>
-  <p:timing>
-    <p:tnLst>
-      <p:par>
-        <p:cTn id="1" dur="indefinite" restart="never" nodeType="tmRoot"/>
-      </p:par>
-    </p:tnLst>
-  </p:timing>
 </p:sld>
 </file>
 
@@ -21112,7 +20865,7 @@
           </a:lstStyle>
           <a:p>
             <a:r>
-              <a:rPr lang="en-US" dirty="0" smtClean="0">
+              <a:rPr lang="en-US" dirty="0">
                 <a:latin typeface="Calibri" charset="0"/>
                 <a:ea typeface="Calibri" charset="0"/>
                 <a:cs typeface="Calibri" charset="0"/>
@@ -21138,13 +20891,6 @@
     <a:masterClrMapping/>
   </p:clrMapOvr>
   <p:transition spd="slow"/>
-  <p:timing>
-    <p:tnLst>
-      <p:par>
-        <p:cTn id="1" dur="indefinite" restart="never" nodeType="tmRoot"/>
-      </p:par>
-    </p:tnLst>
-  </p:timing>
 </p:sld>
 </file>
 
@@ -21181,18 +20927,13 @@
           <a:lstStyle/>
           <a:p>
             <a:r>
-              <a:rPr lang="en-US" dirty="0" smtClean="0">
+              <a:rPr lang="en-US" dirty="0">
                 <a:latin typeface="Calibri" charset="0"/>
                 <a:ea typeface="Calibri" charset="0"/>
                 <a:cs typeface="Calibri" charset="0"/>
               </a:rPr>
               <a:t>Sparkling Water Prerequisites</a:t>
             </a:r>
-            <a:endParaRPr lang="en-US" dirty="0">
-              <a:latin typeface="Calibri" charset="0"/>
-              <a:ea typeface="Calibri" charset="0"/>
-              <a:cs typeface="Calibri" charset="0"/>
-            </a:endParaRPr>
           </a:p>
         </p:txBody>
       </p:sp>
@@ -21231,7 +20972,7 @@
               <a:defRPr/>
             </a:pPr>
             <a:r>
-              <a:rPr lang="en-US" dirty="0" smtClean="0">
+              <a:rPr lang="en-US" dirty="0">
                 <a:latin typeface="Calibri" charset="0"/>
                 <a:ea typeface="Calibri" charset="0"/>
                 <a:cs typeface="Calibri" charset="0"/>
@@ -21271,7 +21012,7 @@
               <a:buSzTx/>
             </a:pPr>
             <a:r>
-              <a:rPr lang="en-US" dirty="0" smtClean="0">
+              <a:rPr lang="en-US" dirty="0">
                 <a:latin typeface="Calibri" charset="0"/>
                 <a:ea typeface="Calibri" charset="0"/>
                 <a:cs typeface="Calibri" charset="0"/>
@@ -21287,18 +21028,13 @@
               <a:buSzTx/>
             </a:pPr>
             <a:r>
-              <a:rPr lang="en-US" dirty="0" smtClean="0">
+              <a:rPr lang="en-US" dirty="0">
                 <a:latin typeface="Calibri" charset="0"/>
                 <a:ea typeface="Calibri" charset="0"/>
                 <a:cs typeface="Calibri" charset="0"/>
               </a:rPr>
               <a:t>Spark 1.6+</a:t>
             </a:r>
-            <a:endParaRPr lang="en-US" dirty="0">
-              <a:latin typeface="Calibri" charset="0"/>
-              <a:ea typeface="Calibri" charset="0"/>
-              <a:cs typeface="Calibri" charset="0"/>
-            </a:endParaRPr>
           </a:p>
         </p:txBody>
       </p:sp>
@@ -21313,13 +21049,6 @@
     <a:masterClrMapping/>
   </p:clrMapOvr>
   <p:transition spd="med"/>
-  <p:timing>
-    <p:tnLst>
-      <p:par>
-        <p:cTn id="1" dur="indefinite" restart="never" nodeType="tmRoot"/>
-      </p:par>
-    </p:tnLst>
-  </p:timing>
 </p:sld>
 </file>
 
@@ -21356,18 +21085,13 @@
           <a:lstStyle/>
           <a:p>
             <a:r>
-              <a:rPr lang="en-US" dirty="0" smtClean="0">
+              <a:rPr lang="en-US" dirty="0">
                 <a:latin typeface="Calibri" charset="0"/>
                 <a:ea typeface="Calibri" charset="0"/>
                 <a:cs typeface="Calibri" charset="0"/>
               </a:rPr>
               <a:t>Installing Sparkling Water</a:t>
             </a:r>
-            <a:endParaRPr lang="en-US" dirty="0">
-              <a:latin typeface="Calibri" charset="0"/>
-              <a:ea typeface="Calibri" charset="0"/>
-              <a:cs typeface="Calibri" charset="0"/>
-            </a:endParaRPr>
           </a:p>
         </p:txBody>
       </p:sp>
@@ -21412,7 +21136,7 @@
           <a:lstStyle/>
           <a:p>
             <a:r>
-              <a:rPr lang="en-US" sz="4000" dirty="0" smtClean="0">
+              <a:rPr lang="en-US" sz="4000" dirty="0">
                 <a:solidFill>
                   <a:srgbClr val="595959"/>
                 </a:solidFill>
@@ -21473,7 +21197,7 @@
           </a:ln>
           <a:extLst>
             <a:ext uri="{C572A759-6A51-4108-AA02-DFA0A04FC94B}">
-              <ma14:wrappingTextBoxFlag xmlns:ma14="http://schemas.microsoft.com/office/mac/drawingml/2011/main" val="1"/>
+              <ma14:wrappingTextBoxFlag xmlns:ma14="http://schemas.microsoft.com/office/mac/drawingml/2011/main" xmlns="" val="1"/>
             </a:ext>
           </a:extLst>
         </p:spPr>
@@ -21829,7 +21553,7 @@
           <a:lstStyle/>
           <a:p>
             <a:r>
-              <a:rPr lang="en-US" sz="4000" dirty="0" smtClean="0">
+              <a:rPr lang="en-US" sz="4000" dirty="0">
                 <a:solidFill>
                   <a:srgbClr val="595959"/>
                 </a:solidFill>
@@ -21890,7 +21614,7 @@
           </a:ln>
           <a:extLst>
             <a:ext uri="{C572A759-6A51-4108-AA02-DFA0A04FC94B}">
-              <ma14:wrappingTextBoxFlag xmlns:ma14="http://schemas.microsoft.com/office/mac/drawingml/2011/main" val="1"/>
+              <ma14:wrappingTextBoxFlag xmlns:ma14="http://schemas.microsoft.com/office/mac/drawingml/2011/main" xmlns="" val="1"/>
             </a:ext>
           </a:extLst>
         </p:spPr>
@@ -22186,7 +21910,7 @@
                 </a:solidFill>
                 <a:latin typeface="Courier" charset="0"/>
               </a:rPr>
-              <a:t>unzip sparkling-water-2.1.2.zip</a:t>
+              <a:t>unzip sparkling-water-2.3.5.zip</a:t>
             </a:r>
           </a:p>
           <a:p>
@@ -22200,7 +21924,7 @@
                 </a:solidFill>
                 <a:latin typeface="Courier" charset="0"/>
               </a:rPr>
-              <a:t>cd sparkling-water-2.1.2</a:t>
+              <a:t>cd sparkling-water-2.3.5</a:t>
             </a:r>
           </a:p>
           <a:p>
@@ -22216,7 +21940,7 @@
               </a:rPr>
               <a:t>bin/sparkling-shell --conf "spark.executor.memory=1g"</a:t>
             </a:r>
-            <a:endParaRPr lang="en-US" sz="3100" dirty="0" smtClean="0">
+            <a:endParaRPr lang="en-US" sz="3100" dirty="0">
               <a:solidFill>
                 <a:srgbClr val="1B1F22"/>
               </a:solidFill>
@@ -22268,7 +21992,7 @@
           <a:lstStyle/>
           <a:p>
             <a:r>
-              <a:rPr lang="en-US" sz="4000" dirty="0" smtClean="0">
+              <a:rPr lang="en-US" sz="4000" dirty="0">
                 <a:solidFill>
                   <a:srgbClr val="595959"/>
                 </a:solidFill>
@@ -22337,13 +22061,6 @@
     <a:masterClrMapping/>
   </p:clrMapOvr>
   <p:transition spd="med"/>
-  <p:timing>
-    <p:tnLst>
-      <p:par>
-        <p:cTn id="1" dur="indefinite" restart="never" nodeType="tmRoot"/>
-      </p:par>
-    </p:tnLst>
-  </p:timing>
 </p:sld>
 </file>
 
@@ -22380,18 +22097,13 @@
           <a:lstStyle/>
           <a:p>
             <a:r>
-              <a:rPr lang="en-US" dirty="0" smtClean="0">
+              <a:rPr lang="en-US" dirty="0">
                 <a:latin typeface="Calibri" charset="0"/>
                 <a:ea typeface="Calibri" charset="0"/>
                 <a:cs typeface="Calibri" charset="0"/>
               </a:rPr>
               <a:t>Installing PySparkling</a:t>
             </a:r>
-            <a:endParaRPr lang="en-US" dirty="0">
-              <a:latin typeface="Calibri" charset="0"/>
-              <a:ea typeface="Calibri" charset="0"/>
-              <a:cs typeface="Calibri" charset="0"/>
-            </a:endParaRPr>
           </a:p>
         </p:txBody>
       </p:sp>
@@ -22435,7 +22147,7 @@
               <a:defRPr/>
             </a:pPr>
             <a:r>
-              <a:rPr lang="en-US" dirty="0" smtClean="0">
+              <a:rPr lang="en-US" dirty="0">
                 <a:latin typeface="Calibri" charset="0"/>
                 <a:ea typeface="Calibri" charset="0"/>
                 <a:cs typeface="Calibri" charset="0"/>
@@ -22526,7 +22238,7 @@
           </a:ln>
           <a:extLst>
             <a:ext uri="{C572A759-6A51-4108-AA02-DFA0A04FC94B}">
-              <ma14:wrappingTextBoxFlag xmlns:ma14="http://schemas.microsoft.com/office/mac/drawingml/2011/main" val="1"/>
+              <ma14:wrappingTextBoxFlag xmlns:ma14="http://schemas.microsoft.com/office/mac/drawingml/2011/main" xmlns="" val="1"/>
             </a:ext>
           </a:extLst>
         </p:spPr>
@@ -22802,7 +22514,7 @@
               <a:buNone/>
             </a:pPr>
             <a:r>
-              <a:rPr lang="en-US" sz="3200" dirty="0" smtClean="0">
+              <a:rPr lang="en-US" sz="3200" dirty="0">
                 <a:solidFill>
                   <a:prstClr val="black"/>
                 </a:solidFill>
@@ -22816,7 +22528,7 @@
               <a:buNone/>
             </a:pPr>
             <a:r>
-              <a:rPr lang="en-US" sz="3200" dirty="0" smtClean="0">
+              <a:rPr lang="en-US" sz="3200" dirty="0">
                 <a:solidFill>
                   <a:prstClr val="black"/>
                 </a:solidFill>
@@ -22830,7 +22542,7 @@
               <a:buNone/>
             </a:pPr>
             <a:r>
-              <a:rPr lang="en-US" sz="3200" dirty="0" smtClean="0">
+              <a:rPr lang="en-US" sz="3200" dirty="0">
                 <a:solidFill>
                   <a:prstClr val="black"/>
                 </a:solidFill>
@@ -22852,20 +22564,9 @@
                 <a:ea typeface="Menlo" charset="0"/>
                 <a:cs typeface="Menlo" charset="0"/>
               </a:rPr>
-              <a:t>p</a:t>
+              <a:t>pip install future</a:t>
             </a:r>
-            <a:r>
-              <a:rPr lang="en-US" sz="3200" dirty="0" smtClean="0">
-                <a:solidFill>
-                  <a:prstClr val="black"/>
-                </a:solidFill>
-                <a:latin typeface="Courier" charset="0"/>
-                <a:ea typeface="Menlo" charset="0"/>
-                <a:cs typeface="Menlo" charset="0"/>
-              </a:rPr>
-              <a:t>ip install future</a:t>
-            </a:r>
-            <a:endParaRPr lang="en-US" sz="3100" dirty="0" smtClean="0">
+            <a:endParaRPr lang="en-US" sz="3100" dirty="0">
               <a:solidFill>
                 <a:srgbClr val="1B1F22"/>
               </a:solidFill>
@@ -22917,7 +22618,7 @@
           <a:lstStyle/>
           <a:p>
             <a:r>
-              <a:rPr lang="en-US" sz="4000" dirty="0" smtClean="0">
+              <a:rPr lang="en-US" sz="4000" dirty="0">
                 <a:solidFill>
                   <a:srgbClr val="595959"/>
                 </a:solidFill>
@@ -22978,7 +22679,7 @@
           </a:ln>
           <a:extLst>
             <a:ext uri="{C572A759-6A51-4108-AA02-DFA0A04FC94B}">
-              <ma14:wrappingTextBoxFlag xmlns:ma14="http://schemas.microsoft.com/office/mac/drawingml/2011/main" val="1"/>
+              <ma14:wrappingTextBoxFlag xmlns:ma14="http://schemas.microsoft.com/office/mac/drawingml/2011/main" xmlns="" val="1"/>
             </a:ext>
           </a:extLst>
         </p:spPr>
@@ -23274,7 +22975,7 @@
                 </a:solidFill>
                 <a:latin typeface="Courier" charset="0"/>
               </a:rPr>
-              <a:t>unzip sparkling-water-2.1.2.zip</a:t>
+              <a:t>unzip sparkling-water-2.3.5.zip</a:t>
             </a:r>
           </a:p>
           <a:p>
@@ -23288,30 +22989,7 @@
                 </a:solidFill>
                 <a:latin typeface="Courier" charset="0"/>
               </a:rPr>
-              <a:t>cd </a:t>
-            </a:r>
-            <a:r>
-              <a:rPr lang="en-US" sz="3200" dirty="0" smtClean="0">
-                <a:solidFill>
-                  <a:prstClr val="black"/>
-                </a:solidFill>
-                <a:latin typeface="Courier" charset="0"/>
-              </a:rPr>
-              <a:t>sparkling-water-2.1.2</a:t>
-            </a:r>
-          </a:p>
-          <a:p>
-            <a:pPr marL="0" indent="0">
-              <a:buNone/>
-            </a:pPr>
-            <a:r>
-              <a:rPr lang="en-US" sz="3200" dirty="0" smtClean="0">
-                <a:solidFill>
-                  <a:prstClr val="black"/>
-                </a:solidFill>
-                <a:latin typeface="Courier" charset="0"/>
-              </a:rPr>
-              <a:t># Run PySparkling</a:t>
+              <a:t>cd sparkling-water-2.3.5</a:t>
             </a:r>
           </a:p>
           <a:p>
@@ -23325,16 +23003,21 @@
                 </a:solidFill>
                 <a:latin typeface="Courier" charset="0"/>
               </a:rPr>
-              <a:t>b</a:t>
+              <a:t># Run PySparkling</a:t>
             </a:r>
+          </a:p>
+          <a:p>
+            <a:pPr marL="0" indent="0">
+              <a:buNone/>
+            </a:pPr>
             <a:r>
-              <a:rPr lang="en-US" sz="3200" dirty="0" smtClean="0">
+              <a:rPr lang="en-US" sz="3200" dirty="0">
                 <a:solidFill>
                   <a:prstClr val="black"/>
                 </a:solidFill>
                 <a:latin typeface="Courier" charset="0"/>
               </a:rPr>
-              <a:t>in/pysparkling</a:t>
+              <a:t>bin/pysparkling</a:t>
             </a:r>
           </a:p>
           <a:p>
@@ -23342,7 +23025,7 @@
               <a:buNone/>
             </a:pPr>
             <a:r>
-              <a:rPr lang="en-US" sz="3200" dirty="0" smtClean="0">
+              <a:rPr lang="en-US" sz="3200" dirty="0">
                 <a:solidFill>
                   <a:prstClr val="black"/>
                 </a:solidFill>
@@ -23356,7 +23039,7 @@
               <a:buNone/>
             </a:pPr>
             <a:r>
-              <a:rPr lang="en-US" sz="3200" dirty="0" smtClean="0">
+              <a:rPr lang="en-US" sz="3200" dirty="0">
                 <a:solidFill>
                   <a:prstClr val="black"/>
                 </a:solidFill>
@@ -23364,12 +23047,6 @@
               </a:rPr>
               <a:t>PYSPARK_DRIVER_PYTHON=“ipython” PYSPARK_DRIVER_PYTHON_OPTS=“notebook” bin/pysparkling</a:t>
             </a:r>
-            <a:endParaRPr lang="en-US" sz="3200" dirty="0">
-              <a:solidFill>
-                <a:prstClr val="black"/>
-              </a:solidFill>
-              <a:latin typeface="Courier" charset="0"/>
-            </a:endParaRPr>
           </a:p>
         </p:txBody>
       </p:sp>
@@ -23414,7 +23091,7 @@
           <a:lstStyle/>
           <a:p>
             <a:r>
-              <a:rPr lang="en-US" sz="4000" dirty="0" smtClean="0">
+              <a:rPr lang="en-US" sz="4000" dirty="0">
                 <a:solidFill>
                   <a:srgbClr val="595959"/>
                 </a:solidFill>
@@ -23453,13 +23130,6 @@
     <a:masterClrMapping/>
   </p:clrMapOvr>
   <p:transition spd="med"/>
-  <p:timing>
-    <p:tnLst>
-      <p:par>
-        <p:cTn id="1" dur="indefinite" restart="never" nodeType="tmRoot"/>
-      </p:par>
-    </p:tnLst>
-  </p:timing>
 </p:sld>
 </file>
 
@@ -23514,7 +23184,7 @@
           </a:lstStyle>
           <a:p>
             <a:r>
-              <a:rPr lang="en-US" dirty="0" smtClean="0">
+              <a:rPr lang="en-US" dirty="0">
                 <a:latin typeface="Calibri" charset="0"/>
                 <a:ea typeface="Calibri" charset="0"/>
                 <a:cs typeface="Calibri" charset="0"/>
@@ -23540,13 +23210,6 @@
     <a:masterClrMapping/>
   </p:clrMapOvr>
   <p:transition spd="slow"/>
-  <p:timing>
-    <p:tnLst>
-      <p:par>
-        <p:cTn id="1" dur="indefinite" restart="never" nodeType="tmRoot"/>
-      </p:par>
-    </p:tnLst>
-  </p:timing>
 </p:sld>
 </file>
 
@@ -23668,18 +23331,13 @@
           <a:lstStyle/>
           <a:p>
             <a:r>
-              <a:rPr lang="en-US" dirty="0" smtClean="0">
+              <a:rPr lang="en-US" dirty="0">
                 <a:latin typeface="Calibri" charset="0"/>
                 <a:ea typeface="Calibri" charset="0"/>
                 <a:cs typeface="Calibri" charset="0"/>
               </a:rPr>
               <a:t>What is Sparkling Water?</a:t>
             </a:r>
-            <a:endParaRPr lang="en-US" dirty="0">
-              <a:latin typeface="Calibri" charset="0"/>
-              <a:ea typeface="Calibri" charset="0"/>
-              <a:cs typeface="Calibri" charset="0"/>
-            </a:endParaRPr>
           </a:p>
         </p:txBody>
       </p:sp>
@@ -23740,7 +23398,7 @@
               <a:tabLst/>
             </a:pPr>
             <a:r>
-              <a:rPr kumimoji="0" lang="en-US" sz="3500" b="0" i="0" u="none" strike="noStrike" cap="none" spc="0" normalizeH="0" baseline="0" dirty="0" smtClean="0">
+              <a:rPr kumimoji="0" lang="en-US" sz="3500" b="0" i="0" u="none" strike="noStrike" cap="none" spc="0" normalizeH="0" baseline="0" dirty="0">
                 <a:ln>
                   <a:noFill/>
                 </a:ln>
@@ -23772,7 +23430,7 @@
               <a:tabLst/>
             </a:pPr>
             <a:r>
-              <a:rPr lang="en-US" sz="3500" dirty="0" smtClean="0"/>
+              <a:rPr lang="en-US" sz="3500" dirty="0"/>
               <a:t>Transparent integration of H2O with Spark ecosystem</a:t>
             </a:r>
           </a:p>
@@ -23794,7 +23452,7 @@
               <a:tabLst/>
             </a:pPr>
             <a:r>
-              <a:rPr kumimoji="0" lang="en-US" sz="3500" b="0" i="0" u="none" strike="noStrike" cap="none" spc="0" normalizeH="0" baseline="0" dirty="0" smtClean="0">
+              <a:rPr kumimoji="0" lang="en-US" sz="3500" b="0" i="0" u="none" strike="noStrike" cap="none" spc="0" normalizeH="0" baseline="0" dirty="0">
                 <a:ln>
                   <a:noFill/>
                 </a:ln>
@@ -23808,7 +23466,7 @@
               <a:t>Transparent</a:t>
             </a:r>
             <a:r>
-              <a:rPr kumimoji="0" lang="en-US" sz="3500" b="0" i="0" u="none" strike="noStrike" cap="none" spc="0" normalizeH="0" dirty="0" smtClean="0">
+              <a:rPr kumimoji="0" lang="en-US" sz="3500" b="0" i="0" u="none" strike="noStrike" cap="none" spc="0" normalizeH="0" dirty="0">
                 <a:ln>
                   <a:noFill/>
                 </a:ln>
@@ -23840,11 +23498,11 @@
               <a:tabLst/>
             </a:pPr>
             <a:r>
-              <a:rPr lang="en-US" sz="3500" baseline="0" dirty="0" smtClean="0"/>
+              <a:rPr lang="en-US" sz="3500" baseline="0" dirty="0"/>
               <a:t>Seamlessly</a:t>
             </a:r>
             <a:r>
-              <a:rPr lang="en-US" sz="3500" dirty="0" smtClean="0"/>
+              <a:rPr lang="en-US" sz="3500" dirty="0"/>
               <a:t> toggle between Spark Dataframes and H2O Frames</a:t>
             </a:r>
             <a:endParaRPr kumimoji="0" lang="en-US" sz="3500" b="0" i="0" u="none" strike="noStrike" cap="none" spc="0" normalizeH="0" baseline="0" dirty="0">
@@ -24003,7 +23661,7 @@
               <a:tabLst/>
             </a:pPr>
             <a:r>
-              <a:rPr kumimoji="0" lang="en-US" sz="4000" b="0" i="0" u="none" strike="noStrike" cap="none" spc="0" normalizeH="0" baseline="0" dirty="0" smtClean="0">
+              <a:rPr kumimoji="0" lang="en-US" sz="4000" b="0" i="0" u="none" strike="noStrike" cap="none" spc="0" normalizeH="0" baseline="0" dirty="0">
                 <a:ln>
                   <a:noFill/>
                 </a:ln>
@@ -24035,7 +23693,7 @@
               <a:tabLst/>
             </a:pPr>
             <a:r>
-              <a:rPr lang="en-US" sz="4000" dirty="0" smtClean="0">
+              <a:rPr lang="en-US" sz="4000" dirty="0">
                 <a:solidFill>
                   <a:schemeClr val="bg1"/>
                 </a:solidFill>
@@ -24352,7 +24010,7 @@
               <a:tabLst/>
             </a:pPr>
             <a:r>
-              <a:rPr kumimoji="0" lang="en-US" sz="5500" b="0" i="0" u="none" strike="noStrike" cap="none" spc="0" normalizeH="0" baseline="0" dirty="0" smtClean="0">
+              <a:rPr kumimoji="0" lang="en-US" sz="5500" b="0" i="0" u="none" strike="noStrike" cap="none" spc="0" normalizeH="0" baseline="0" dirty="0">
                 <a:ln>
                   <a:noFill/>
                 </a:ln>
@@ -24368,20 +24026,6 @@
               </a:rPr>
               <a:t>Modeling</a:t>
             </a:r>
-            <a:endParaRPr kumimoji="0" lang="en-US" sz="5500" b="0" i="0" u="none" strike="noStrike" cap="none" spc="0" normalizeH="0" baseline="0" dirty="0">
-              <a:ln>
-                <a:noFill/>
-              </a:ln>
-              <a:solidFill>
-                <a:srgbClr val="000000"/>
-              </a:solidFill>
-              <a:effectLst/>
-              <a:uFillTx/>
-              <a:latin typeface="+mn-lt"/>
-              <a:ea typeface="+mn-ea"/>
-              <a:cs typeface="+mn-cs"/>
-              <a:sym typeface="Calibri"/>
-            </a:endParaRPr>
           </a:p>
         </p:txBody>
       </p:sp>
@@ -24442,7 +24086,7 @@
               <a:tabLst/>
             </a:pPr>
             <a:r>
-              <a:rPr kumimoji="0" lang="en-US" sz="5500" b="0" i="0" u="none" strike="noStrike" cap="none" spc="0" normalizeH="0" baseline="0" dirty="0" smtClean="0">
+              <a:rPr kumimoji="0" lang="en-US" sz="5500" b="0" i="0" u="none" strike="noStrike" cap="none" spc="0" normalizeH="0" baseline="0" dirty="0">
                 <a:ln>
                   <a:noFill/>
                 </a:ln>
@@ -24458,20 +24102,6 @@
               </a:rPr>
               <a:t>Data Munging</a:t>
             </a:r>
-            <a:endParaRPr kumimoji="0" lang="en-US" sz="5500" b="0" i="0" u="none" strike="noStrike" cap="none" spc="0" normalizeH="0" baseline="0" dirty="0">
-              <a:ln>
-                <a:noFill/>
-              </a:ln>
-              <a:solidFill>
-                <a:srgbClr val="000000"/>
-              </a:solidFill>
-              <a:effectLst/>
-              <a:uFillTx/>
-              <a:latin typeface="+mn-lt"/>
-              <a:ea typeface="+mn-ea"/>
-              <a:cs typeface="+mn-cs"/>
-              <a:sym typeface="Calibri"/>
-            </a:endParaRPr>
           </a:p>
         </p:txBody>
       </p:sp>
@@ -24532,7 +24162,7 @@
               <a:tabLst/>
             </a:pPr>
             <a:r>
-              <a:rPr kumimoji="0" lang="en-US" sz="5500" b="0" i="0" u="none" strike="noStrike" cap="none" spc="0" normalizeH="0" baseline="0" smtClean="0">
+              <a:rPr kumimoji="0" lang="en-US" sz="5500" b="0" i="0" u="none" strike="noStrike" cap="none" spc="0" normalizeH="0" baseline="0">
                 <a:ln>
                   <a:noFill/>
                 </a:ln>
@@ -24567,7 +24197,7 @@
               <a:tabLst/>
             </a:pPr>
             <a:r>
-              <a:rPr lang="en-US" sz="5500" dirty="0" smtClean="0"/>
+              <a:rPr lang="en-US" sz="5500" dirty="0"/>
               <a:t>Processing</a:t>
             </a:r>
             <a:endParaRPr kumimoji="0" lang="en-US" sz="5500" b="0" i="0" u="none" strike="noStrike" cap="none" spc="0" normalizeH="0" baseline="0" dirty="0">
@@ -25215,13 +24845,6 @@
     <a:masterClrMapping/>
   </p:clrMapOvr>
   <p:transition spd="med"/>
-  <p:timing>
-    <p:tnLst>
-      <p:par>
-        <p:cTn id="1" dur="indefinite" restart="never" nodeType="tmRoot"/>
-      </p:par>
-    </p:tnLst>
-  </p:timing>
 </p:sld>
 </file>
 

</xml_diff>